<commit_message>
More plots for OLET5608
</commit_message>
<xml_diff>
--- a/olet5608/OLET5608 Presentation.pptx
+++ b/olet5608/OLET5608 Presentation.pptx
@@ -295,7 +295,7 @@
           <a:p>
             <a:fld id="{49A2865F-B372-43D2-8255-7FA4007EBB59}" type="datetimeFigureOut">
               <a:rPr lang="en-AU" smtClean="0"/>
-              <a:t>27/4/21</a:t>
+              <a:t>28/4/21</a:t>
             </a:fld>
             <a:endParaRPr lang="en-AU"/>
           </a:p>
@@ -460,7 +460,7 @@
           <a:p>
             <a:fld id="{0834D938-244D-4739-949C-2C3FCC68DC46}" type="datetimeFigureOut">
               <a:rPr lang="en-AU" smtClean="0"/>
-              <a:t>27/4/21</a:t>
+              <a:t>28/4/21</a:t>
             </a:fld>
             <a:endParaRPr lang="en-AU"/>
           </a:p>
@@ -4330,7 +4330,7 @@
           <a:graphicData uri="http://schemas.openxmlformats.org/presentationml/2006/ole">
             <mc:AlternateContent xmlns:mc="http://schemas.openxmlformats.org/markup-compatibility/2006">
               <mc:Choice xmlns:v="urn:schemas-microsoft-com:vml" Requires="v">
-                <p:oleObj spid="_x0000_s6157" name="think-cell Slide" r:id="rId4" imgW="270" imgH="270" progId="TCLayout.ActiveDocument.1">
+                <p:oleObj spid="_x0000_s6159" name="think-cell Slide" r:id="rId4" imgW="270" imgH="270" progId="TCLayout.ActiveDocument.1">
                   <p:embed/>
                 </p:oleObj>
               </mc:Choice>
@@ -5035,7 +5035,7 @@
           <a:graphicData uri="http://schemas.openxmlformats.org/presentationml/2006/ole">
             <mc:AlternateContent xmlns:mc="http://schemas.openxmlformats.org/markup-compatibility/2006">
               <mc:Choice xmlns:v="urn:schemas-microsoft-com:vml" Requires="v">
-                <p:oleObj spid="_x0000_s2061" name="think-cell Slide" r:id="rId5" imgW="270" imgH="270" progId="TCLayout.ActiveDocument.1">
+                <p:oleObj spid="_x0000_s2063" name="think-cell Slide" r:id="rId5" imgW="270" imgH="270" progId="TCLayout.ActiveDocument.1">
                   <p:embed/>
                 </p:oleObj>
               </mc:Choice>
@@ -7145,7 +7145,7 @@
           <a:graphicData uri="http://schemas.openxmlformats.org/presentationml/2006/ole">
             <mc:AlternateContent xmlns:mc="http://schemas.openxmlformats.org/markup-compatibility/2006">
               <mc:Choice xmlns:v="urn:schemas-microsoft-com:vml" Requires="v">
-                <p:oleObj spid="_x0000_s7181" name="think-cell Slide" r:id="rId4" imgW="270" imgH="270" progId="TCLayout.ActiveDocument.1">
+                <p:oleObj spid="_x0000_s7183" name="think-cell Slide" r:id="rId4" imgW="270" imgH="270" progId="TCLayout.ActiveDocument.1">
                   <p:embed/>
                 </p:oleObj>
               </mc:Choice>
@@ -7798,7 +7798,7 @@
           <a:graphicData uri="http://schemas.openxmlformats.org/presentationml/2006/ole">
             <mc:AlternateContent xmlns:mc="http://schemas.openxmlformats.org/markup-compatibility/2006">
               <mc:Choice xmlns:v="urn:schemas-microsoft-com:vml" Requires="v">
-                <p:oleObj spid="_x0000_s8205" name="think-cell Slide" r:id="rId4" imgW="270" imgH="270" progId="TCLayout.ActiveDocument.1">
+                <p:oleObj spid="_x0000_s8207" name="think-cell Slide" r:id="rId4" imgW="270" imgH="270" progId="TCLayout.ActiveDocument.1">
                   <p:embed/>
                 </p:oleObj>
               </mc:Choice>
@@ -18438,7 +18438,7 @@
           <a:graphicData uri="http://schemas.openxmlformats.org/presentationml/2006/ole">
             <mc:AlternateContent xmlns:mc="http://schemas.openxmlformats.org/markup-compatibility/2006">
               <mc:Choice xmlns:v="urn:schemas-microsoft-com:vml" Requires="v">
-                <p:oleObj spid="_x0000_s3085" name="think-cell Slide" r:id="rId4" imgW="270" imgH="270" progId="TCLayout.ActiveDocument.1">
+                <p:oleObj spid="_x0000_s3087" name="think-cell Slide" r:id="rId4" imgW="270" imgH="270" progId="TCLayout.ActiveDocument.1">
                   <p:embed/>
                 </p:oleObj>
               </mc:Choice>
@@ -23795,7 +23795,7 @@
           <a:graphicData uri="http://schemas.openxmlformats.org/presentationml/2006/ole">
             <mc:AlternateContent xmlns:mc="http://schemas.openxmlformats.org/markup-compatibility/2006">
               <mc:Choice xmlns:v="urn:schemas-microsoft-com:vml" Requires="v">
-                <p:oleObj spid="_x0000_s4109" name="think-cell Slide" r:id="rId4" imgW="270" imgH="270" progId="TCLayout.ActiveDocument.1">
+                <p:oleObj spid="_x0000_s4111" name="think-cell Slide" r:id="rId4" imgW="270" imgH="270" progId="TCLayout.ActiveDocument.1">
                   <p:embed/>
                 </p:oleObj>
               </mc:Choice>
@@ -24107,7 +24107,7 @@
           <a:graphicData uri="http://schemas.openxmlformats.org/presentationml/2006/ole">
             <mc:AlternateContent xmlns:mc="http://schemas.openxmlformats.org/markup-compatibility/2006">
               <mc:Choice xmlns:v="urn:schemas-microsoft-com:vml" Requires="v">
-                <p:oleObj spid="_x0000_s5133" name="think-cell Slide" r:id="rId4" imgW="270" imgH="270" progId="TCLayout.ActiveDocument.1">
+                <p:oleObj spid="_x0000_s5135" name="think-cell Slide" r:id="rId4" imgW="270" imgH="270" progId="TCLayout.ActiveDocument.1">
                   <p:embed/>
                 </p:oleObj>
               </mc:Choice>
@@ -24424,7 +24424,7 @@
           <a:graphicData uri="http://schemas.openxmlformats.org/presentationml/2006/ole">
             <mc:AlternateContent xmlns:mc="http://schemas.openxmlformats.org/markup-compatibility/2006">
               <mc:Choice xmlns:v="urn:schemas-microsoft-com:vml" Requires="v">
-                <p:oleObj spid="_x0000_s1037" name="think-cell Slide" r:id="rId49" imgW="270" imgH="270" progId="TCLayout.ActiveDocument.1">
+                <p:oleObj spid="_x0000_s1039" name="think-cell Slide" r:id="rId49" imgW="270" imgH="270" progId="TCLayout.ActiveDocument.1">
                   <p:embed/>
                 </p:oleObj>
               </mc:Choice>
@@ -25843,872 +25843,898 @@
           </a:p>
         </p:txBody>
       </p:sp>
-      <p:sp>
-        <p:nvSpPr>
-          <p:cNvPr id="3" name="Content Placeholder 2">
+      <p:grpSp>
+        <p:nvGrpSpPr>
+          <p:cNvPr id="4" name="Group 3">
             <a:extLst>
               <a:ext uri="{FF2B5EF4-FFF2-40B4-BE49-F238E27FC236}">
-                <a16:creationId xmlns:a16="http://schemas.microsoft.com/office/drawing/2014/main" id="{F2C96EF5-B754-432F-BC8A-5ADF27FDF0F5}"/>
+                <a16:creationId xmlns:a16="http://schemas.microsoft.com/office/drawing/2014/main" id="{D83B57B3-319F-F142-85CE-81E8FE6BE2D3}"/>
               </a:ext>
             </a:extLst>
           </p:cNvPr>
-          <p:cNvSpPr>
-            <a:spLocks noGrp="1"/>
-          </p:cNvSpPr>
-          <p:nvPr>
-            <p:ph sz="quarter" idx="23"/>
-          </p:nvPr>
-        </p:nvSpPr>
-        <p:spPr>
-          <a:xfrm>
-            <a:off x="666751" y="1774062"/>
-            <a:ext cx="5323981" cy="3858642"/>
-          </a:xfrm>
-        </p:spPr>
-        <p:txBody>
-          <a:bodyPr/>
-          <a:lstStyle/>
-          <a:p>
-            <a:endParaRPr lang="en-AU"/>
-          </a:p>
-        </p:txBody>
-      </p:sp>
-      <p:sp>
-        <p:nvSpPr>
-          <p:cNvPr id="5" name="Rectangle 4">
+          <p:cNvGrpSpPr/>
+          <p:nvPr/>
+        </p:nvGrpSpPr>
+        <p:grpSpPr>
+          <a:xfrm>
+            <a:off x="666750" y="1666110"/>
+            <a:ext cx="5323982" cy="4074545"/>
+            <a:chOff x="6199681" y="1774062"/>
+            <a:chExt cx="5323982" cy="4074545"/>
+          </a:xfrm>
+        </p:grpSpPr>
+        <p:sp>
+          <p:nvSpPr>
+            <p:cNvPr id="5" name="Rectangle 4">
+              <a:extLst>
+                <a:ext uri="{FF2B5EF4-FFF2-40B4-BE49-F238E27FC236}">
+                  <a16:creationId xmlns:a16="http://schemas.microsoft.com/office/drawing/2014/main" id="{DF615AC2-05CE-489E-BA41-596539B000FC}"/>
+                </a:ext>
+              </a:extLst>
+            </p:cNvPr>
+            <p:cNvSpPr/>
+            <p:nvPr/>
+          </p:nvSpPr>
+          <p:spPr>
+            <a:xfrm>
+              <a:off x="6199682" y="2184532"/>
+              <a:ext cx="5323980" cy="437409"/>
+            </a:xfrm>
+            <a:prstGeom prst="rect">
+              <a:avLst/>
+            </a:prstGeom>
+            <a:solidFill>
+              <a:schemeClr val="bg1"/>
+            </a:solidFill>
+            <a:ln w="38100">
+              <a:solidFill>
+                <a:schemeClr val="accent1"/>
+              </a:solidFill>
+            </a:ln>
+          </p:spPr>
+          <p:style>
+            <a:lnRef idx="2">
+              <a:schemeClr val="accent1">
+                <a:shade val="50000"/>
+              </a:schemeClr>
+            </a:lnRef>
+            <a:fillRef idx="1">
+              <a:schemeClr val="accent1"/>
+            </a:fillRef>
+            <a:effectRef idx="0">
+              <a:schemeClr val="accent1"/>
+            </a:effectRef>
+            <a:fontRef idx="minor">
+              <a:schemeClr val="lt1"/>
+            </a:fontRef>
+          </p:style>
+          <p:txBody>
+            <a:bodyPr rtlCol="0" anchor="ctr"/>
+            <a:lstStyle/>
+            <a:p>
+              <a:pPr algn="ctr"/>
+              <a:r>
+                <a:rPr lang="en-AU" sz="1800" dirty="0">
+                  <a:solidFill>
+                    <a:schemeClr val="bg2"/>
+                  </a:solidFill>
+                </a:rPr>
+                <a:t>Data extraction from API</a:t>
+              </a:r>
+            </a:p>
+          </p:txBody>
+        </p:sp>
+        <p:sp>
+          <p:nvSpPr>
+            <p:cNvPr id="6" name="Content Placeholder 5">
+              <a:extLst>
+                <a:ext uri="{FF2B5EF4-FFF2-40B4-BE49-F238E27FC236}">
+                  <a16:creationId xmlns:a16="http://schemas.microsoft.com/office/drawing/2014/main" id="{8C61B274-F30C-A44A-90EC-761E050262D4}"/>
+                </a:ext>
+              </a:extLst>
+            </p:cNvPr>
+            <p:cNvSpPr txBox="1">
+              <a:spLocks/>
+            </p:cNvSpPr>
+            <p:nvPr/>
+          </p:nvSpPr>
+          <p:spPr>
+            <a:xfrm>
+              <a:off x="6199681" y="1774062"/>
+              <a:ext cx="5323981" cy="291312"/>
+            </a:xfrm>
+            <a:prstGeom prst="rect">
+              <a:avLst/>
+            </a:prstGeom>
+          </p:spPr>
+          <p:txBody>
+            <a:bodyPr/>
+            <a:lstStyle>
+              <a:lvl1pPr marL="0" indent="0" algn="l" defTabSz="1039033" rtl="0" eaLnBrk="1" latinLnBrk="0" hangingPunct="1">
+                <a:spcBef>
+                  <a:spcPts val="455"/>
+                </a:spcBef>
+                <a:buFont typeface="Arial" pitchFamily="34" charset="0"/>
+                <a:buNone/>
+                <a:defRPr sz="2000" kern="1200" spc="0">
+                  <a:solidFill>
+                    <a:schemeClr val="bg2"/>
+                  </a:solidFill>
+                  <a:latin typeface="Segoe UI" panose="020B0502040204020203" pitchFamily="34" charset="0"/>
+                  <a:ea typeface="Segoe UI" panose="020B0502040204020203" pitchFamily="34" charset="0"/>
+                  <a:cs typeface="Segoe UI" panose="020B0502040204020203" pitchFamily="34" charset="0"/>
+                </a:defRPr>
+              </a:lvl1pPr>
+              <a:lvl2pPr marL="0" indent="-360000" algn="l" defTabSz="1039033" rtl="0" eaLnBrk="1" latinLnBrk="0" hangingPunct="1">
+                <a:spcBef>
+                  <a:spcPts val="455"/>
+                </a:spcBef>
+                <a:buClr>
+                  <a:schemeClr val="bg2"/>
+                </a:buClr>
+                <a:buFont typeface="Arial" pitchFamily="34" charset="0"/>
+                <a:buChar char="•"/>
+                <a:defRPr sz="2000" kern="1200" spc="0">
+                  <a:solidFill>
+                    <a:schemeClr val="bg2"/>
+                  </a:solidFill>
+                  <a:latin typeface="Segoe UI" panose="020B0502040204020203" pitchFamily="34" charset="0"/>
+                  <a:ea typeface="Segoe UI" panose="020B0502040204020203" pitchFamily="34" charset="0"/>
+                  <a:cs typeface="Segoe UI" panose="020B0502040204020203" pitchFamily="34" charset="0"/>
+                </a:defRPr>
+              </a:lvl2pPr>
+              <a:lvl3pPr marL="720000" indent="-360000" algn="l" defTabSz="1039033" rtl="0" eaLnBrk="1" latinLnBrk="0" hangingPunct="1">
+                <a:spcBef>
+                  <a:spcPts val="455"/>
+                </a:spcBef>
+                <a:buClr>
+                  <a:schemeClr val="bg2"/>
+                </a:buClr>
+                <a:buFont typeface="Segoe UI" panose="020B0502040204020203" pitchFamily="34" charset="0"/>
+                <a:buChar char="–"/>
+                <a:defRPr sz="2000" kern="1200" spc="0">
+                  <a:solidFill>
+                    <a:schemeClr val="bg2"/>
+                  </a:solidFill>
+                  <a:latin typeface="Segoe UI" panose="020B0502040204020203" pitchFamily="34" charset="0"/>
+                  <a:ea typeface="Segoe UI" panose="020B0502040204020203" pitchFamily="34" charset="0"/>
+                  <a:cs typeface="Segoe UI" panose="020B0502040204020203" pitchFamily="34" charset="0"/>
+                </a:defRPr>
+              </a:lvl3pPr>
+              <a:lvl4pPr marL="1080000" indent="-360000" algn="l" defTabSz="1039033" rtl="0" eaLnBrk="1" latinLnBrk="0" hangingPunct="1">
+                <a:spcBef>
+                  <a:spcPts val="455"/>
+                </a:spcBef>
+                <a:buClr>
+                  <a:schemeClr val="bg2"/>
+                </a:buClr>
+                <a:buFont typeface="Arial" pitchFamily="34" charset="0"/>
+                <a:buChar char="•"/>
+                <a:defRPr sz="2000" kern="1200" spc="0">
+                  <a:solidFill>
+                    <a:schemeClr val="bg2"/>
+                  </a:solidFill>
+                  <a:latin typeface="Segoe UI" panose="020B0502040204020203" pitchFamily="34" charset="0"/>
+                  <a:ea typeface="Segoe UI" panose="020B0502040204020203" pitchFamily="34" charset="0"/>
+                  <a:cs typeface="Segoe UI" panose="020B0502040204020203" pitchFamily="34" charset="0"/>
+                </a:defRPr>
+              </a:lvl4pPr>
+              <a:lvl5pPr marL="1440000" indent="-360000" algn="l" defTabSz="1039033" rtl="0" eaLnBrk="1" latinLnBrk="0" hangingPunct="1">
+                <a:spcBef>
+                  <a:spcPts val="455"/>
+                </a:spcBef>
+                <a:buClr>
+                  <a:schemeClr val="bg2"/>
+                </a:buClr>
+                <a:buFont typeface="Segoe UI" panose="020B0502040204020203" pitchFamily="34" charset="0"/>
+                <a:buChar char="–"/>
+                <a:defRPr sz="2000" kern="1200" spc="0">
+                  <a:solidFill>
+                    <a:schemeClr val="bg2"/>
+                  </a:solidFill>
+                  <a:latin typeface="Segoe UI" panose="020B0502040204020203" pitchFamily="34" charset="0"/>
+                  <a:ea typeface="Segoe UI" panose="020B0502040204020203" pitchFamily="34" charset="0"/>
+                  <a:cs typeface="Segoe UI" panose="020B0502040204020203" pitchFamily="34" charset="0"/>
+                </a:defRPr>
+              </a:lvl5pPr>
+              <a:lvl6pPr marL="720000" indent="-360000" algn="l" defTabSz="1039033" rtl="0" eaLnBrk="1" latinLnBrk="0" hangingPunct="1">
+                <a:spcBef>
+                  <a:spcPts val="455"/>
+                </a:spcBef>
+                <a:buClr>
+                  <a:schemeClr val="bg2"/>
+                </a:buClr>
+                <a:buFont typeface="+mj-lt"/>
+                <a:buAutoNum type="arabicPeriod"/>
+                <a:defRPr sz="2000" kern="1200" spc="0" baseline="0">
+                  <a:solidFill>
+                    <a:schemeClr val="bg2"/>
+                  </a:solidFill>
+                  <a:latin typeface="Segoe UI" panose="020B0502040204020203" pitchFamily="34" charset="0"/>
+                  <a:ea typeface="Segoe UI" panose="020B0502040204020203" pitchFamily="34" charset="0"/>
+                  <a:cs typeface="Segoe UI" panose="020B0502040204020203" pitchFamily="34" charset="0"/>
+                </a:defRPr>
+              </a:lvl6pPr>
+              <a:lvl7pPr marL="1080000" indent="-360000" algn="l" defTabSz="1039033" rtl="0" eaLnBrk="1" latinLnBrk="0" hangingPunct="1">
+                <a:spcBef>
+                  <a:spcPts val="455"/>
+                </a:spcBef>
+                <a:buClr>
+                  <a:schemeClr val="bg2"/>
+                </a:buClr>
+                <a:buFont typeface="+mj-lt"/>
+                <a:buAutoNum type="alphaLcPeriod"/>
+                <a:defRPr sz="2000" kern="1200" spc="0">
+                  <a:solidFill>
+                    <a:schemeClr val="bg2"/>
+                  </a:solidFill>
+                  <a:latin typeface="Segoe UI" panose="020B0502040204020203" pitchFamily="34" charset="0"/>
+                  <a:ea typeface="Segoe UI" panose="020B0502040204020203" pitchFamily="34" charset="0"/>
+                  <a:cs typeface="Segoe UI" panose="020B0502040204020203" pitchFamily="34" charset="0"/>
+                </a:defRPr>
+              </a:lvl7pPr>
+              <a:lvl8pPr marL="1440000" indent="-360000" algn="l" defTabSz="1039033" rtl="0" eaLnBrk="1" latinLnBrk="0" hangingPunct="1">
+                <a:spcBef>
+                  <a:spcPts val="455"/>
+                </a:spcBef>
+                <a:buClr>
+                  <a:schemeClr val="bg2"/>
+                </a:buClr>
+                <a:buFont typeface="+mj-lt"/>
+                <a:buAutoNum type="romanLcPeriod"/>
+                <a:defRPr sz="2000" kern="1200" spc="0" baseline="0">
+                  <a:solidFill>
+                    <a:schemeClr val="bg2"/>
+                  </a:solidFill>
+                  <a:latin typeface="Segoe UI" panose="020B0502040204020203" pitchFamily="34" charset="0"/>
+                  <a:ea typeface="Segoe UI" panose="020B0502040204020203" pitchFamily="34" charset="0"/>
+                  <a:cs typeface="Segoe UI" panose="020B0502040204020203" pitchFamily="34" charset="0"/>
+                </a:defRPr>
+              </a:lvl8pPr>
+              <a:lvl9pPr marL="4415889" indent="-259758" algn="l" defTabSz="1039033" rtl="0" eaLnBrk="1" latinLnBrk="0" hangingPunct="1">
+                <a:spcBef>
+                  <a:spcPct val="20000"/>
+                </a:spcBef>
+                <a:buFont typeface="Arial" pitchFamily="34" charset="0"/>
+                <a:buChar char="•"/>
+                <a:defRPr sz="2300" kern="1200">
+                  <a:solidFill>
+                    <a:schemeClr val="tx1"/>
+                  </a:solidFill>
+                  <a:latin typeface="+mn-lt"/>
+                  <a:ea typeface="+mn-ea"/>
+                  <a:cs typeface="+mn-cs"/>
+                </a:defRPr>
+              </a:lvl9pPr>
+            </a:lstStyle>
+            <a:p>
+              <a:r>
+                <a:rPr lang="en-AU" dirty="0">
+                  <a:latin typeface="Segoe UI Semibold" panose="020B0702040204020203" pitchFamily="34" charset="0"/>
+                  <a:cs typeface="Segoe UI Semibold" panose="020B0702040204020203" pitchFamily="34" charset="0"/>
+                </a:rPr>
+                <a:t>Overall analytical workflow</a:t>
+              </a:r>
+            </a:p>
+          </p:txBody>
+        </p:sp>
+        <p:sp>
+          <p:nvSpPr>
+            <p:cNvPr id="7" name="Rectangle 6">
+              <a:extLst>
+                <a:ext uri="{FF2B5EF4-FFF2-40B4-BE49-F238E27FC236}">
+                  <a16:creationId xmlns:a16="http://schemas.microsoft.com/office/drawing/2014/main" id="{D523E57A-6DBF-5B49-BEB2-EF468A06DFE1}"/>
+                </a:ext>
+              </a:extLst>
+            </p:cNvPr>
+            <p:cNvSpPr/>
+            <p:nvPr/>
+          </p:nvSpPr>
+          <p:spPr>
+            <a:xfrm>
+              <a:off x="6199682" y="2992387"/>
+              <a:ext cx="5323980" cy="437408"/>
+            </a:xfrm>
+            <a:prstGeom prst="rect">
+              <a:avLst/>
+            </a:prstGeom>
+            <a:solidFill>
+              <a:schemeClr val="bg1"/>
+            </a:solidFill>
+            <a:ln w="38100">
+              <a:solidFill>
+                <a:schemeClr val="accent2"/>
+              </a:solidFill>
+            </a:ln>
+          </p:spPr>
+          <p:style>
+            <a:lnRef idx="2">
+              <a:schemeClr val="accent1">
+                <a:shade val="50000"/>
+              </a:schemeClr>
+            </a:lnRef>
+            <a:fillRef idx="1">
+              <a:schemeClr val="accent1"/>
+            </a:fillRef>
+            <a:effectRef idx="0">
+              <a:schemeClr val="accent1"/>
+            </a:effectRef>
+            <a:fontRef idx="minor">
+              <a:schemeClr val="lt1"/>
+            </a:fontRef>
+          </p:style>
+          <p:txBody>
+            <a:bodyPr rtlCol="0" anchor="ctr"/>
+            <a:lstStyle/>
+            <a:p>
+              <a:pPr algn="ctr"/>
+              <a:r>
+                <a:rPr lang="en-AU" sz="1800" dirty="0">
+                  <a:solidFill>
+                    <a:schemeClr val="bg2"/>
+                  </a:solidFill>
+                </a:rPr>
+                <a:t>Data cleaning and aggregation</a:t>
+              </a:r>
+            </a:p>
+          </p:txBody>
+        </p:sp>
+        <p:sp>
+          <p:nvSpPr>
+            <p:cNvPr id="8" name="Rectangle 7">
+              <a:extLst>
+                <a:ext uri="{FF2B5EF4-FFF2-40B4-BE49-F238E27FC236}">
+                  <a16:creationId xmlns:a16="http://schemas.microsoft.com/office/drawing/2014/main" id="{4CEB6935-57EF-FB44-9D21-B147E0DCECBF}"/>
+                </a:ext>
+              </a:extLst>
+            </p:cNvPr>
+            <p:cNvSpPr/>
+            <p:nvPr/>
+          </p:nvSpPr>
+          <p:spPr>
+            <a:xfrm>
+              <a:off x="6199682" y="3800241"/>
+              <a:ext cx="5323980" cy="435032"/>
+            </a:xfrm>
+            <a:prstGeom prst="rect">
+              <a:avLst/>
+            </a:prstGeom>
+            <a:solidFill>
+              <a:schemeClr val="bg1"/>
+            </a:solidFill>
+            <a:ln w="38100">
+              <a:solidFill>
+                <a:schemeClr val="accent3"/>
+              </a:solidFill>
+            </a:ln>
+          </p:spPr>
+          <p:style>
+            <a:lnRef idx="2">
+              <a:schemeClr val="accent1">
+                <a:shade val="50000"/>
+              </a:schemeClr>
+            </a:lnRef>
+            <a:fillRef idx="1">
+              <a:schemeClr val="accent1"/>
+            </a:fillRef>
+            <a:effectRef idx="0">
+              <a:schemeClr val="accent1"/>
+            </a:effectRef>
+            <a:fontRef idx="minor">
+              <a:schemeClr val="lt1"/>
+            </a:fontRef>
+          </p:style>
+          <p:txBody>
+            <a:bodyPr rtlCol="0" anchor="ctr"/>
+            <a:lstStyle/>
+            <a:p>
+              <a:pPr algn="ctr"/>
+              <a:r>
+                <a:rPr lang="en-AU" sz="1800" dirty="0">
+                  <a:solidFill>
+                    <a:schemeClr val="bg2"/>
+                  </a:solidFill>
+                </a:rPr>
+                <a:t>Exploratory data analysis and visualisation</a:t>
+              </a:r>
+            </a:p>
+          </p:txBody>
+        </p:sp>
+        <p:sp>
+          <p:nvSpPr>
+            <p:cNvPr id="9" name="Rectangle 8">
+              <a:extLst>
+                <a:ext uri="{FF2B5EF4-FFF2-40B4-BE49-F238E27FC236}">
+                  <a16:creationId xmlns:a16="http://schemas.microsoft.com/office/drawing/2014/main" id="{164F7BDC-911D-FE4E-AF5F-B5F0E1CD831B}"/>
+                </a:ext>
+              </a:extLst>
+            </p:cNvPr>
+            <p:cNvSpPr/>
+            <p:nvPr/>
+          </p:nvSpPr>
+          <p:spPr>
+            <a:xfrm>
+              <a:off x="6199681" y="4608095"/>
+              <a:ext cx="2427032" cy="435032"/>
+            </a:xfrm>
+            <a:prstGeom prst="rect">
+              <a:avLst/>
+            </a:prstGeom>
+            <a:solidFill>
+              <a:schemeClr val="bg1"/>
+            </a:solidFill>
+            <a:ln w="38100">
+              <a:solidFill>
+                <a:schemeClr val="accent4"/>
+              </a:solidFill>
+            </a:ln>
+          </p:spPr>
+          <p:style>
+            <a:lnRef idx="2">
+              <a:schemeClr val="accent1">
+                <a:shade val="50000"/>
+              </a:schemeClr>
+            </a:lnRef>
+            <a:fillRef idx="1">
+              <a:schemeClr val="accent1"/>
+            </a:fillRef>
+            <a:effectRef idx="0">
+              <a:schemeClr val="accent1"/>
+            </a:effectRef>
+            <a:fontRef idx="minor">
+              <a:schemeClr val="lt1"/>
+            </a:fontRef>
+          </p:style>
+          <p:txBody>
+            <a:bodyPr rtlCol="0" anchor="ctr"/>
+            <a:lstStyle/>
+            <a:p>
+              <a:pPr algn="ctr"/>
+              <a:r>
+                <a:rPr lang="en-AU" sz="1800" dirty="0">
+                  <a:solidFill>
+                    <a:schemeClr val="bg2"/>
+                  </a:solidFill>
+                </a:rPr>
+                <a:t>Linear model fitting</a:t>
+              </a:r>
+            </a:p>
+          </p:txBody>
+        </p:sp>
+        <p:sp>
+          <p:nvSpPr>
+            <p:cNvPr id="10" name="Rectangle 9">
+              <a:extLst>
+                <a:ext uri="{FF2B5EF4-FFF2-40B4-BE49-F238E27FC236}">
+                  <a16:creationId xmlns:a16="http://schemas.microsoft.com/office/drawing/2014/main" id="{AA0E7FCB-E6C1-044E-A589-80C95413E588}"/>
+                </a:ext>
+              </a:extLst>
+            </p:cNvPr>
+            <p:cNvSpPr/>
+            <p:nvPr/>
+          </p:nvSpPr>
+          <p:spPr>
+            <a:xfrm>
+              <a:off x="9096631" y="4610470"/>
+              <a:ext cx="2427032" cy="432657"/>
+            </a:xfrm>
+            <a:prstGeom prst="rect">
+              <a:avLst/>
+            </a:prstGeom>
+            <a:solidFill>
+              <a:schemeClr val="bg1"/>
+            </a:solidFill>
+            <a:ln w="38100">
+              <a:solidFill>
+                <a:schemeClr val="accent4"/>
+              </a:solidFill>
+            </a:ln>
+          </p:spPr>
+          <p:style>
+            <a:lnRef idx="2">
+              <a:schemeClr val="accent1">
+                <a:shade val="50000"/>
+              </a:schemeClr>
+            </a:lnRef>
+            <a:fillRef idx="1">
+              <a:schemeClr val="accent1"/>
+            </a:fillRef>
+            <a:effectRef idx="0">
+              <a:schemeClr val="accent1"/>
+            </a:effectRef>
+            <a:fontRef idx="minor">
+              <a:schemeClr val="lt1"/>
+            </a:fontRef>
+          </p:style>
+          <p:txBody>
+            <a:bodyPr rtlCol="0" anchor="ctr"/>
+            <a:lstStyle/>
+            <a:p>
+              <a:pPr algn="ctr"/>
+              <a:r>
+                <a:rPr lang="en-AU" sz="1800" dirty="0">
+                  <a:solidFill>
+                    <a:schemeClr val="bg2"/>
+                  </a:solidFill>
+                </a:rPr>
+                <a:t>Assumption checking</a:t>
+              </a:r>
+            </a:p>
+          </p:txBody>
+        </p:sp>
+        <p:sp>
+          <p:nvSpPr>
+            <p:cNvPr id="11" name="Rectangle 10">
+              <a:extLst>
+                <a:ext uri="{FF2B5EF4-FFF2-40B4-BE49-F238E27FC236}">
+                  <a16:creationId xmlns:a16="http://schemas.microsoft.com/office/drawing/2014/main" id="{7D542D0D-EF30-4847-8178-8E04C773B099}"/>
+                </a:ext>
+              </a:extLst>
+            </p:cNvPr>
+            <p:cNvSpPr/>
+            <p:nvPr/>
+          </p:nvSpPr>
+          <p:spPr>
+            <a:xfrm>
+              <a:off x="6199682" y="5415949"/>
+              <a:ext cx="5323980" cy="432658"/>
+            </a:xfrm>
+            <a:prstGeom prst="rect">
+              <a:avLst/>
+            </a:prstGeom>
+            <a:solidFill>
+              <a:schemeClr val="bg1"/>
+            </a:solidFill>
+            <a:ln w="38100">
+              <a:solidFill>
+                <a:schemeClr val="accent6"/>
+              </a:solidFill>
+            </a:ln>
+          </p:spPr>
+          <p:style>
+            <a:lnRef idx="2">
+              <a:schemeClr val="accent1">
+                <a:shade val="50000"/>
+              </a:schemeClr>
+            </a:lnRef>
+            <a:fillRef idx="1">
+              <a:schemeClr val="accent1"/>
+            </a:fillRef>
+            <a:effectRef idx="0">
+              <a:schemeClr val="accent1"/>
+            </a:effectRef>
+            <a:fontRef idx="minor">
+              <a:schemeClr val="lt1"/>
+            </a:fontRef>
+          </p:style>
+          <p:txBody>
+            <a:bodyPr rtlCol="0" anchor="ctr"/>
+            <a:lstStyle/>
+            <a:p>
+              <a:pPr algn="ctr"/>
+              <a:r>
+                <a:rPr lang="en-AU" sz="1800" dirty="0">
+                  <a:solidFill>
+                    <a:schemeClr val="bg2"/>
+                  </a:solidFill>
+                </a:rPr>
+                <a:t>Final model outputs and performance analysis</a:t>
+              </a:r>
+            </a:p>
+          </p:txBody>
+        </p:sp>
+        <p:cxnSp>
+          <p:nvCxnSpPr>
+            <p:cNvPr id="12" name="Straight Arrow Connector 11">
+              <a:extLst>
+                <a:ext uri="{FF2B5EF4-FFF2-40B4-BE49-F238E27FC236}">
+                  <a16:creationId xmlns:a16="http://schemas.microsoft.com/office/drawing/2014/main" id="{D4DFDD97-F27F-014E-B453-8666ECBB72BE}"/>
+                </a:ext>
+              </a:extLst>
+            </p:cNvPr>
+            <p:cNvCxnSpPr>
+              <a:cxnSpLocks/>
+              <a:stCxn id="5" idx="2"/>
+              <a:endCxn id="7" idx="0"/>
+            </p:cNvCxnSpPr>
+            <p:nvPr/>
+          </p:nvCxnSpPr>
+          <p:spPr>
+            <a:xfrm>
+              <a:off x="8861672" y="2621941"/>
+              <a:ext cx="0" cy="370446"/>
+            </a:xfrm>
+            <a:prstGeom prst="straightConnector1">
+              <a:avLst/>
+            </a:prstGeom>
+            <a:ln w="25400">
+              <a:solidFill>
+                <a:schemeClr val="bg2"/>
+              </a:solidFill>
+              <a:tailEnd type="triangle"/>
+            </a:ln>
+          </p:spPr>
+          <p:style>
+            <a:lnRef idx="1">
+              <a:schemeClr val="accent1"/>
+            </a:lnRef>
+            <a:fillRef idx="0">
+              <a:schemeClr val="accent1"/>
+            </a:fillRef>
+            <a:effectRef idx="0">
+              <a:schemeClr val="accent1"/>
+            </a:effectRef>
+            <a:fontRef idx="minor">
+              <a:schemeClr val="tx1"/>
+            </a:fontRef>
+          </p:style>
+        </p:cxnSp>
+        <p:cxnSp>
+          <p:nvCxnSpPr>
+            <p:cNvPr id="14" name="Straight Arrow Connector 13">
+              <a:extLst>
+                <a:ext uri="{FF2B5EF4-FFF2-40B4-BE49-F238E27FC236}">
+                  <a16:creationId xmlns:a16="http://schemas.microsoft.com/office/drawing/2014/main" id="{A484AA67-07B3-6642-9D7F-697800CA4C9F}"/>
+                </a:ext>
+              </a:extLst>
+            </p:cNvPr>
+            <p:cNvCxnSpPr>
+              <a:cxnSpLocks/>
+              <a:stCxn id="7" idx="2"/>
+              <a:endCxn id="8" idx="0"/>
+            </p:cNvCxnSpPr>
+            <p:nvPr/>
+          </p:nvCxnSpPr>
+          <p:spPr>
+            <a:xfrm>
+              <a:off x="8861672" y="3429795"/>
+              <a:ext cx="0" cy="370446"/>
+            </a:xfrm>
+            <a:prstGeom prst="straightConnector1">
+              <a:avLst/>
+            </a:prstGeom>
+            <a:ln w="25400">
+              <a:solidFill>
+                <a:schemeClr val="bg2"/>
+              </a:solidFill>
+              <a:tailEnd type="triangle"/>
+            </a:ln>
+          </p:spPr>
+          <p:style>
+            <a:lnRef idx="1">
+              <a:schemeClr val="accent1"/>
+            </a:lnRef>
+            <a:fillRef idx="0">
+              <a:schemeClr val="accent1"/>
+            </a:fillRef>
+            <a:effectRef idx="0">
+              <a:schemeClr val="accent1"/>
+            </a:effectRef>
+            <a:fontRef idx="minor">
+              <a:schemeClr val="tx1"/>
+            </a:fontRef>
+          </p:style>
+        </p:cxnSp>
+        <p:cxnSp>
+          <p:nvCxnSpPr>
+            <p:cNvPr id="16" name="Straight Arrow Connector 15">
+              <a:extLst>
+                <a:ext uri="{FF2B5EF4-FFF2-40B4-BE49-F238E27FC236}">
+                  <a16:creationId xmlns:a16="http://schemas.microsoft.com/office/drawing/2014/main" id="{2CC0B4D5-F5DA-F542-A10A-D0EF0A982F41}"/>
+                </a:ext>
+              </a:extLst>
+            </p:cNvPr>
+            <p:cNvCxnSpPr>
+              <a:cxnSpLocks/>
+            </p:cNvCxnSpPr>
+            <p:nvPr/>
+          </p:nvCxnSpPr>
+          <p:spPr>
+            <a:xfrm>
+              <a:off x="6224850" y="4235273"/>
+              <a:ext cx="0" cy="372821"/>
+            </a:xfrm>
+            <a:prstGeom prst="straightConnector1">
+              <a:avLst/>
+            </a:prstGeom>
+            <a:ln w="25400">
+              <a:solidFill>
+                <a:schemeClr val="bg2"/>
+              </a:solidFill>
+              <a:tailEnd type="triangle"/>
+            </a:ln>
+          </p:spPr>
+          <p:style>
+            <a:lnRef idx="1">
+              <a:schemeClr val="accent1"/>
+            </a:lnRef>
+            <a:fillRef idx="0">
+              <a:schemeClr val="accent1"/>
+            </a:fillRef>
+            <a:effectRef idx="0">
+              <a:schemeClr val="accent1"/>
+            </a:effectRef>
+            <a:fontRef idx="minor">
+              <a:schemeClr val="tx1"/>
+            </a:fontRef>
+          </p:style>
+        </p:cxnSp>
+        <p:cxnSp>
+          <p:nvCxnSpPr>
+            <p:cNvPr id="18" name="Curved Connector 17">
+              <a:extLst>
+                <a:ext uri="{FF2B5EF4-FFF2-40B4-BE49-F238E27FC236}">
+                  <a16:creationId xmlns:a16="http://schemas.microsoft.com/office/drawing/2014/main" id="{F2869C33-ABFD-8541-8E97-3DEAE371F6CD}"/>
+                </a:ext>
+              </a:extLst>
+            </p:cNvPr>
+            <p:cNvCxnSpPr>
+              <a:cxnSpLocks/>
+              <a:stCxn id="9" idx="2"/>
+              <a:endCxn id="10" idx="2"/>
+            </p:cNvCxnSpPr>
+            <p:nvPr/>
+          </p:nvCxnSpPr>
+          <p:spPr>
+            <a:xfrm rot="16200000" flipH="1">
+              <a:off x="8861672" y="3594652"/>
+              <a:ext cx="12700" cy="2896950"/>
+            </a:xfrm>
+            <a:prstGeom prst="curvedConnector3">
+              <a:avLst>
+                <a:gd name="adj1" fmla="val 1800000"/>
+              </a:avLst>
+            </a:prstGeom>
+            <a:ln w="25400">
+              <a:solidFill>
+                <a:schemeClr val="bg2"/>
+              </a:solidFill>
+              <a:tailEnd type="triangle"/>
+            </a:ln>
+          </p:spPr>
+          <p:style>
+            <a:lnRef idx="1">
+              <a:schemeClr val="accent1"/>
+            </a:lnRef>
+            <a:fillRef idx="0">
+              <a:schemeClr val="accent1"/>
+            </a:fillRef>
+            <a:effectRef idx="0">
+              <a:schemeClr val="accent1"/>
+            </a:effectRef>
+            <a:fontRef idx="minor">
+              <a:schemeClr val="tx1"/>
+            </a:fontRef>
+          </p:style>
+        </p:cxnSp>
+        <p:cxnSp>
+          <p:nvCxnSpPr>
+            <p:cNvPr id="20" name="Curved Connector 19">
+              <a:extLst>
+                <a:ext uri="{FF2B5EF4-FFF2-40B4-BE49-F238E27FC236}">
+                  <a16:creationId xmlns:a16="http://schemas.microsoft.com/office/drawing/2014/main" id="{E8038A1A-FBEA-1042-BDBE-65E689760613}"/>
+                </a:ext>
+              </a:extLst>
+            </p:cNvPr>
+            <p:cNvCxnSpPr>
+              <a:cxnSpLocks/>
+              <a:stCxn id="10" idx="0"/>
+              <a:endCxn id="9" idx="0"/>
+            </p:cNvCxnSpPr>
+            <p:nvPr/>
+          </p:nvCxnSpPr>
+          <p:spPr>
+            <a:xfrm rot="16200000" flipV="1">
+              <a:off x="8860485" y="3160808"/>
+              <a:ext cx="2375" cy="2896950"/>
+            </a:xfrm>
+            <a:prstGeom prst="curvedConnector3">
+              <a:avLst>
+                <a:gd name="adj1" fmla="val 9725263"/>
+              </a:avLst>
+            </a:prstGeom>
+            <a:ln w="25400">
+              <a:solidFill>
+                <a:schemeClr val="bg2"/>
+              </a:solidFill>
+              <a:tailEnd type="triangle"/>
+            </a:ln>
+          </p:spPr>
+          <p:style>
+            <a:lnRef idx="1">
+              <a:schemeClr val="accent1"/>
+            </a:lnRef>
+            <a:fillRef idx="0">
+              <a:schemeClr val="accent1"/>
+            </a:fillRef>
+            <a:effectRef idx="0">
+              <a:schemeClr val="accent1"/>
+            </a:effectRef>
+            <a:fontRef idx="minor">
+              <a:schemeClr val="tx1"/>
+            </a:fontRef>
+          </p:style>
+        </p:cxnSp>
+        <p:cxnSp>
+          <p:nvCxnSpPr>
+            <p:cNvPr id="23" name="Straight Arrow Connector 22">
+              <a:extLst>
+                <a:ext uri="{FF2B5EF4-FFF2-40B4-BE49-F238E27FC236}">
+                  <a16:creationId xmlns:a16="http://schemas.microsoft.com/office/drawing/2014/main" id="{D91A0A48-E99C-8241-A67F-4DD233452C2A}"/>
+                </a:ext>
+              </a:extLst>
+            </p:cNvPr>
+            <p:cNvCxnSpPr>
+              <a:cxnSpLocks/>
+            </p:cNvCxnSpPr>
+            <p:nvPr/>
+          </p:nvCxnSpPr>
+          <p:spPr>
+            <a:xfrm>
+              <a:off x="11523662" y="5049477"/>
+              <a:ext cx="0" cy="366471"/>
+            </a:xfrm>
+            <a:prstGeom prst="straightConnector1">
+              <a:avLst/>
+            </a:prstGeom>
+            <a:ln w="25400">
+              <a:solidFill>
+                <a:schemeClr val="bg2"/>
+              </a:solidFill>
+              <a:tailEnd type="triangle"/>
+            </a:ln>
+          </p:spPr>
+          <p:style>
+            <a:lnRef idx="1">
+              <a:schemeClr val="accent1"/>
+            </a:lnRef>
+            <a:fillRef idx="0">
+              <a:schemeClr val="accent1"/>
+            </a:fillRef>
+            <a:effectRef idx="0">
+              <a:schemeClr val="accent1"/>
+            </a:effectRef>
+            <a:fontRef idx="minor">
+              <a:schemeClr val="tx1"/>
+            </a:fontRef>
+          </p:style>
+        </p:cxnSp>
+      </p:grpSp>
+      <p:pic>
+        <p:nvPicPr>
+          <p:cNvPr id="19" name="Picture 18">
             <a:extLst>
               <a:ext uri="{FF2B5EF4-FFF2-40B4-BE49-F238E27FC236}">
-                <a16:creationId xmlns:a16="http://schemas.microsoft.com/office/drawing/2014/main" id="{DF615AC2-05CE-489E-BA41-596539B000FC}"/>
+                <a16:creationId xmlns:a16="http://schemas.microsoft.com/office/drawing/2014/main" id="{5B97C6F4-252D-224F-BDEB-870FEF698A8C}"/>
               </a:ext>
             </a:extLst>
           </p:cNvPr>
-          <p:cNvSpPr/>
+          <p:cNvPicPr>
+            <a:picLocks noChangeAspect="1"/>
+          </p:cNvPicPr>
           <p:nvPr/>
-        </p:nvSpPr>
-        <p:spPr>
-          <a:xfrm>
-            <a:off x="6199682" y="2184532"/>
-            <a:ext cx="5323980" cy="437409"/>
-          </a:xfrm>
-          <a:prstGeom prst="rect">
-            <a:avLst/>
-          </a:prstGeom>
-          <a:solidFill>
-            <a:schemeClr val="bg1"/>
-          </a:solidFill>
-          <a:ln w="38100">
-            <a:solidFill>
-              <a:schemeClr val="accent1"/>
-            </a:solidFill>
-          </a:ln>
-        </p:spPr>
-        <p:style>
-          <a:lnRef idx="2">
-            <a:schemeClr val="accent1">
-              <a:shade val="50000"/>
-            </a:schemeClr>
-          </a:lnRef>
-          <a:fillRef idx="1">
-            <a:schemeClr val="accent1"/>
-          </a:fillRef>
-          <a:effectRef idx="0">
-            <a:schemeClr val="accent1"/>
-          </a:effectRef>
-          <a:fontRef idx="minor">
-            <a:schemeClr val="lt1"/>
-          </a:fontRef>
-        </p:style>
-        <p:txBody>
-          <a:bodyPr rtlCol="0" anchor="ctr"/>
-          <a:lstStyle/>
-          <a:p>
-            <a:pPr algn="ctr"/>
-            <a:r>
-              <a:rPr lang="en-AU" sz="1800" dirty="0">
-                <a:solidFill>
-                  <a:schemeClr val="bg2"/>
-                </a:solidFill>
-              </a:rPr>
-              <a:t>Data extraction from API</a:t>
-            </a:r>
-          </a:p>
-        </p:txBody>
-      </p:sp>
-      <p:sp>
-        <p:nvSpPr>
-          <p:cNvPr id="6" name="Content Placeholder 5">
+        </p:nvPicPr>
+        <p:blipFill>
+          <a:blip r:embed="rId2">
             <a:extLst>
-              <a:ext uri="{FF2B5EF4-FFF2-40B4-BE49-F238E27FC236}">
-                <a16:creationId xmlns:a16="http://schemas.microsoft.com/office/drawing/2014/main" id="{8C61B274-F30C-A44A-90EC-761E050262D4}"/>
+              <a:ext uri="{28A0092B-C50C-407E-A947-70E740481C1C}">
+                <a14:useLocalDpi xmlns:a14="http://schemas.microsoft.com/office/drawing/2010/main" val="0"/>
               </a:ext>
             </a:extLst>
-          </p:cNvPr>
-          <p:cNvSpPr txBox="1">
-            <a:spLocks/>
-          </p:cNvSpPr>
-          <p:nvPr/>
-        </p:nvSpPr>
-        <p:spPr>
-          <a:xfrm>
-            <a:off x="6199681" y="1774062"/>
-            <a:ext cx="5323981" cy="291312"/>
-          </a:xfrm>
-          <a:prstGeom prst="rect">
-            <a:avLst/>
-          </a:prstGeom>
-        </p:spPr>
-        <p:txBody>
-          <a:bodyPr/>
-          <a:lstStyle>
-            <a:lvl1pPr marL="0" indent="0" algn="l" defTabSz="1039033" rtl="0" eaLnBrk="1" latinLnBrk="0" hangingPunct="1">
-              <a:spcBef>
-                <a:spcPts val="455"/>
-              </a:spcBef>
-              <a:buFont typeface="Arial" pitchFamily="34" charset="0"/>
-              <a:buNone/>
-              <a:defRPr sz="2000" kern="1200" spc="0">
-                <a:solidFill>
-                  <a:schemeClr val="bg2"/>
-                </a:solidFill>
-                <a:latin typeface="Segoe UI" panose="020B0502040204020203" pitchFamily="34" charset="0"/>
-                <a:ea typeface="Segoe UI" panose="020B0502040204020203" pitchFamily="34" charset="0"/>
-                <a:cs typeface="Segoe UI" panose="020B0502040204020203" pitchFamily="34" charset="0"/>
-              </a:defRPr>
-            </a:lvl1pPr>
-            <a:lvl2pPr marL="0" indent="-360000" algn="l" defTabSz="1039033" rtl="0" eaLnBrk="1" latinLnBrk="0" hangingPunct="1">
-              <a:spcBef>
-                <a:spcPts val="455"/>
-              </a:spcBef>
-              <a:buClr>
-                <a:schemeClr val="bg2"/>
-              </a:buClr>
-              <a:buFont typeface="Arial" pitchFamily="34" charset="0"/>
-              <a:buChar char="•"/>
-              <a:defRPr sz="2000" kern="1200" spc="0">
-                <a:solidFill>
-                  <a:schemeClr val="bg2"/>
-                </a:solidFill>
-                <a:latin typeface="Segoe UI" panose="020B0502040204020203" pitchFamily="34" charset="0"/>
-                <a:ea typeface="Segoe UI" panose="020B0502040204020203" pitchFamily="34" charset="0"/>
-                <a:cs typeface="Segoe UI" panose="020B0502040204020203" pitchFamily="34" charset="0"/>
-              </a:defRPr>
-            </a:lvl2pPr>
-            <a:lvl3pPr marL="720000" indent="-360000" algn="l" defTabSz="1039033" rtl="0" eaLnBrk="1" latinLnBrk="0" hangingPunct="1">
-              <a:spcBef>
-                <a:spcPts val="455"/>
-              </a:spcBef>
-              <a:buClr>
-                <a:schemeClr val="bg2"/>
-              </a:buClr>
-              <a:buFont typeface="Segoe UI" panose="020B0502040204020203" pitchFamily="34" charset="0"/>
-              <a:buChar char="–"/>
-              <a:defRPr sz="2000" kern="1200" spc="0">
-                <a:solidFill>
-                  <a:schemeClr val="bg2"/>
-                </a:solidFill>
-                <a:latin typeface="Segoe UI" panose="020B0502040204020203" pitchFamily="34" charset="0"/>
-                <a:ea typeface="Segoe UI" panose="020B0502040204020203" pitchFamily="34" charset="0"/>
-                <a:cs typeface="Segoe UI" panose="020B0502040204020203" pitchFamily="34" charset="0"/>
-              </a:defRPr>
-            </a:lvl3pPr>
-            <a:lvl4pPr marL="1080000" indent="-360000" algn="l" defTabSz="1039033" rtl="0" eaLnBrk="1" latinLnBrk="0" hangingPunct="1">
-              <a:spcBef>
-                <a:spcPts val="455"/>
-              </a:spcBef>
-              <a:buClr>
-                <a:schemeClr val="bg2"/>
-              </a:buClr>
-              <a:buFont typeface="Arial" pitchFamily="34" charset="0"/>
-              <a:buChar char="•"/>
-              <a:defRPr sz="2000" kern="1200" spc="0">
-                <a:solidFill>
-                  <a:schemeClr val="bg2"/>
-                </a:solidFill>
-                <a:latin typeface="Segoe UI" panose="020B0502040204020203" pitchFamily="34" charset="0"/>
-                <a:ea typeface="Segoe UI" panose="020B0502040204020203" pitchFamily="34" charset="0"/>
-                <a:cs typeface="Segoe UI" panose="020B0502040204020203" pitchFamily="34" charset="0"/>
-              </a:defRPr>
-            </a:lvl4pPr>
-            <a:lvl5pPr marL="1440000" indent="-360000" algn="l" defTabSz="1039033" rtl="0" eaLnBrk="1" latinLnBrk="0" hangingPunct="1">
-              <a:spcBef>
-                <a:spcPts val="455"/>
-              </a:spcBef>
-              <a:buClr>
-                <a:schemeClr val="bg2"/>
-              </a:buClr>
-              <a:buFont typeface="Segoe UI" panose="020B0502040204020203" pitchFamily="34" charset="0"/>
-              <a:buChar char="–"/>
-              <a:defRPr sz="2000" kern="1200" spc="0">
-                <a:solidFill>
-                  <a:schemeClr val="bg2"/>
-                </a:solidFill>
-                <a:latin typeface="Segoe UI" panose="020B0502040204020203" pitchFamily="34" charset="0"/>
-                <a:ea typeface="Segoe UI" panose="020B0502040204020203" pitchFamily="34" charset="0"/>
-                <a:cs typeface="Segoe UI" panose="020B0502040204020203" pitchFamily="34" charset="0"/>
-              </a:defRPr>
-            </a:lvl5pPr>
-            <a:lvl6pPr marL="720000" indent="-360000" algn="l" defTabSz="1039033" rtl="0" eaLnBrk="1" latinLnBrk="0" hangingPunct="1">
-              <a:spcBef>
-                <a:spcPts val="455"/>
-              </a:spcBef>
-              <a:buClr>
-                <a:schemeClr val="bg2"/>
-              </a:buClr>
-              <a:buFont typeface="+mj-lt"/>
-              <a:buAutoNum type="arabicPeriod"/>
-              <a:defRPr sz="2000" kern="1200" spc="0" baseline="0">
-                <a:solidFill>
-                  <a:schemeClr val="bg2"/>
-                </a:solidFill>
-                <a:latin typeface="Segoe UI" panose="020B0502040204020203" pitchFamily="34" charset="0"/>
-                <a:ea typeface="Segoe UI" panose="020B0502040204020203" pitchFamily="34" charset="0"/>
-                <a:cs typeface="Segoe UI" panose="020B0502040204020203" pitchFamily="34" charset="0"/>
-              </a:defRPr>
-            </a:lvl6pPr>
-            <a:lvl7pPr marL="1080000" indent="-360000" algn="l" defTabSz="1039033" rtl="0" eaLnBrk="1" latinLnBrk="0" hangingPunct="1">
-              <a:spcBef>
-                <a:spcPts val="455"/>
-              </a:spcBef>
-              <a:buClr>
-                <a:schemeClr val="bg2"/>
-              </a:buClr>
-              <a:buFont typeface="+mj-lt"/>
-              <a:buAutoNum type="alphaLcPeriod"/>
-              <a:defRPr sz="2000" kern="1200" spc="0">
-                <a:solidFill>
-                  <a:schemeClr val="bg2"/>
-                </a:solidFill>
-                <a:latin typeface="Segoe UI" panose="020B0502040204020203" pitchFamily="34" charset="0"/>
-                <a:ea typeface="Segoe UI" panose="020B0502040204020203" pitchFamily="34" charset="0"/>
-                <a:cs typeface="Segoe UI" panose="020B0502040204020203" pitchFamily="34" charset="0"/>
-              </a:defRPr>
-            </a:lvl7pPr>
-            <a:lvl8pPr marL="1440000" indent="-360000" algn="l" defTabSz="1039033" rtl="0" eaLnBrk="1" latinLnBrk="0" hangingPunct="1">
-              <a:spcBef>
-                <a:spcPts val="455"/>
-              </a:spcBef>
-              <a:buClr>
-                <a:schemeClr val="bg2"/>
-              </a:buClr>
-              <a:buFont typeface="+mj-lt"/>
-              <a:buAutoNum type="romanLcPeriod"/>
-              <a:defRPr sz="2000" kern="1200" spc="0" baseline="0">
-                <a:solidFill>
-                  <a:schemeClr val="bg2"/>
-                </a:solidFill>
-                <a:latin typeface="Segoe UI" panose="020B0502040204020203" pitchFamily="34" charset="0"/>
-                <a:ea typeface="Segoe UI" panose="020B0502040204020203" pitchFamily="34" charset="0"/>
-                <a:cs typeface="Segoe UI" panose="020B0502040204020203" pitchFamily="34" charset="0"/>
-              </a:defRPr>
-            </a:lvl8pPr>
-            <a:lvl9pPr marL="4415889" indent="-259758" algn="l" defTabSz="1039033" rtl="0" eaLnBrk="1" latinLnBrk="0" hangingPunct="1">
-              <a:spcBef>
-                <a:spcPct val="20000"/>
-              </a:spcBef>
-              <a:buFont typeface="Arial" pitchFamily="34" charset="0"/>
-              <a:buChar char="•"/>
-              <a:defRPr sz="2300" kern="1200">
-                <a:solidFill>
-                  <a:schemeClr val="tx1"/>
-                </a:solidFill>
-                <a:latin typeface="+mn-lt"/>
-                <a:ea typeface="+mn-ea"/>
-                <a:cs typeface="+mn-cs"/>
-              </a:defRPr>
-            </a:lvl9pPr>
-          </a:lstStyle>
-          <a:p>
-            <a:r>
-              <a:rPr lang="en-AU" dirty="0">
-                <a:latin typeface="Segoe UI Semibold" panose="020B0702040204020203" pitchFamily="34" charset="0"/>
-                <a:cs typeface="Segoe UI Semibold" panose="020B0702040204020203" pitchFamily="34" charset="0"/>
-              </a:rPr>
-              <a:t>Overall analytical workflow</a:t>
-            </a:r>
-          </a:p>
-        </p:txBody>
-      </p:sp>
-      <p:sp>
-        <p:nvSpPr>
-          <p:cNvPr id="7" name="Rectangle 6">
-            <a:extLst>
-              <a:ext uri="{FF2B5EF4-FFF2-40B4-BE49-F238E27FC236}">
-                <a16:creationId xmlns:a16="http://schemas.microsoft.com/office/drawing/2014/main" id="{D523E57A-6DBF-5B49-BEB2-EF468A06DFE1}"/>
-              </a:ext>
-            </a:extLst>
-          </p:cNvPr>
-          <p:cNvSpPr/>
-          <p:nvPr/>
-        </p:nvSpPr>
-        <p:spPr>
-          <a:xfrm>
-            <a:off x="6199682" y="2992387"/>
-            <a:ext cx="5323980" cy="437408"/>
-          </a:xfrm>
-          <a:prstGeom prst="rect">
-            <a:avLst/>
-          </a:prstGeom>
-          <a:solidFill>
-            <a:schemeClr val="bg1"/>
-          </a:solidFill>
-          <a:ln w="38100">
-            <a:solidFill>
-              <a:schemeClr val="accent2"/>
-            </a:solidFill>
-          </a:ln>
-        </p:spPr>
-        <p:style>
-          <a:lnRef idx="2">
-            <a:schemeClr val="accent1">
-              <a:shade val="50000"/>
-            </a:schemeClr>
-          </a:lnRef>
-          <a:fillRef idx="1">
-            <a:schemeClr val="accent1"/>
-          </a:fillRef>
-          <a:effectRef idx="0">
-            <a:schemeClr val="accent1"/>
-          </a:effectRef>
-          <a:fontRef idx="minor">
-            <a:schemeClr val="lt1"/>
-          </a:fontRef>
-        </p:style>
-        <p:txBody>
-          <a:bodyPr rtlCol="0" anchor="ctr"/>
-          <a:lstStyle/>
-          <a:p>
-            <a:pPr algn="ctr"/>
-            <a:r>
-              <a:rPr lang="en-AU" sz="1800" dirty="0">
-                <a:solidFill>
-                  <a:schemeClr val="bg2"/>
-                </a:solidFill>
-              </a:rPr>
-              <a:t>Data cleaning and aggregation</a:t>
-            </a:r>
-          </a:p>
-        </p:txBody>
-      </p:sp>
-      <p:sp>
-        <p:nvSpPr>
-          <p:cNvPr id="8" name="Rectangle 7">
-            <a:extLst>
-              <a:ext uri="{FF2B5EF4-FFF2-40B4-BE49-F238E27FC236}">
-                <a16:creationId xmlns:a16="http://schemas.microsoft.com/office/drawing/2014/main" id="{4CEB6935-57EF-FB44-9D21-B147E0DCECBF}"/>
-              </a:ext>
-            </a:extLst>
-          </p:cNvPr>
-          <p:cNvSpPr/>
-          <p:nvPr/>
-        </p:nvSpPr>
-        <p:spPr>
-          <a:xfrm>
-            <a:off x="6199682" y="3800241"/>
-            <a:ext cx="5323980" cy="435032"/>
-          </a:xfrm>
-          <a:prstGeom prst="rect">
-            <a:avLst/>
-          </a:prstGeom>
-          <a:solidFill>
-            <a:schemeClr val="bg1"/>
-          </a:solidFill>
-          <a:ln w="38100">
-            <a:solidFill>
-              <a:schemeClr val="accent3"/>
-            </a:solidFill>
-          </a:ln>
-        </p:spPr>
-        <p:style>
-          <a:lnRef idx="2">
-            <a:schemeClr val="accent1">
-              <a:shade val="50000"/>
-            </a:schemeClr>
-          </a:lnRef>
-          <a:fillRef idx="1">
-            <a:schemeClr val="accent1"/>
-          </a:fillRef>
-          <a:effectRef idx="0">
-            <a:schemeClr val="accent1"/>
-          </a:effectRef>
-          <a:fontRef idx="minor">
-            <a:schemeClr val="lt1"/>
-          </a:fontRef>
-        </p:style>
-        <p:txBody>
-          <a:bodyPr rtlCol="0" anchor="ctr"/>
-          <a:lstStyle/>
-          <a:p>
-            <a:pPr algn="ctr"/>
-            <a:r>
-              <a:rPr lang="en-AU" sz="1800" dirty="0">
-                <a:solidFill>
-                  <a:schemeClr val="bg2"/>
-                </a:solidFill>
-              </a:rPr>
-              <a:t>Exploratory data analysis and visualisation</a:t>
-            </a:r>
-          </a:p>
-        </p:txBody>
-      </p:sp>
-      <p:sp>
-        <p:nvSpPr>
-          <p:cNvPr id="9" name="Rectangle 8">
-            <a:extLst>
-              <a:ext uri="{FF2B5EF4-FFF2-40B4-BE49-F238E27FC236}">
-                <a16:creationId xmlns:a16="http://schemas.microsoft.com/office/drawing/2014/main" id="{164F7BDC-911D-FE4E-AF5F-B5F0E1CD831B}"/>
-              </a:ext>
-            </a:extLst>
-          </p:cNvPr>
-          <p:cNvSpPr/>
-          <p:nvPr/>
-        </p:nvSpPr>
-        <p:spPr>
-          <a:xfrm>
-            <a:off x="6199681" y="4608095"/>
-            <a:ext cx="2427032" cy="435032"/>
-          </a:xfrm>
-          <a:prstGeom prst="rect">
-            <a:avLst/>
-          </a:prstGeom>
-          <a:solidFill>
-            <a:schemeClr val="bg1"/>
-          </a:solidFill>
-          <a:ln w="38100">
-            <a:solidFill>
-              <a:schemeClr val="accent4"/>
-            </a:solidFill>
-          </a:ln>
-        </p:spPr>
-        <p:style>
-          <a:lnRef idx="2">
-            <a:schemeClr val="accent1">
-              <a:shade val="50000"/>
-            </a:schemeClr>
-          </a:lnRef>
-          <a:fillRef idx="1">
-            <a:schemeClr val="accent1"/>
-          </a:fillRef>
-          <a:effectRef idx="0">
-            <a:schemeClr val="accent1"/>
-          </a:effectRef>
-          <a:fontRef idx="minor">
-            <a:schemeClr val="lt1"/>
-          </a:fontRef>
-        </p:style>
-        <p:txBody>
-          <a:bodyPr rtlCol="0" anchor="ctr"/>
-          <a:lstStyle/>
-          <a:p>
-            <a:pPr algn="ctr"/>
-            <a:r>
-              <a:rPr lang="en-AU" sz="1800" dirty="0">
-                <a:solidFill>
-                  <a:schemeClr val="bg2"/>
-                </a:solidFill>
-              </a:rPr>
-              <a:t>Linear model fitting</a:t>
-            </a:r>
-          </a:p>
-        </p:txBody>
-      </p:sp>
-      <p:sp>
-        <p:nvSpPr>
-          <p:cNvPr id="10" name="Rectangle 9">
-            <a:extLst>
-              <a:ext uri="{FF2B5EF4-FFF2-40B4-BE49-F238E27FC236}">
-                <a16:creationId xmlns:a16="http://schemas.microsoft.com/office/drawing/2014/main" id="{AA0E7FCB-E6C1-044E-A589-80C95413E588}"/>
-              </a:ext>
-            </a:extLst>
-          </p:cNvPr>
-          <p:cNvSpPr/>
-          <p:nvPr/>
-        </p:nvSpPr>
-        <p:spPr>
-          <a:xfrm>
-            <a:off x="9096631" y="4610470"/>
-            <a:ext cx="2427032" cy="432657"/>
-          </a:xfrm>
-          <a:prstGeom prst="rect">
-            <a:avLst/>
-          </a:prstGeom>
-          <a:solidFill>
-            <a:schemeClr val="bg1"/>
-          </a:solidFill>
-          <a:ln w="38100">
-            <a:solidFill>
-              <a:schemeClr val="accent4"/>
-            </a:solidFill>
-          </a:ln>
-        </p:spPr>
-        <p:style>
-          <a:lnRef idx="2">
-            <a:schemeClr val="accent1">
-              <a:shade val="50000"/>
-            </a:schemeClr>
-          </a:lnRef>
-          <a:fillRef idx="1">
-            <a:schemeClr val="accent1"/>
-          </a:fillRef>
-          <a:effectRef idx="0">
-            <a:schemeClr val="accent1"/>
-          </a:effectRef>
-          <a:fontRef idx="minor">
-            <a:schemeClr val="lt1"/>
-          </a:fontRef>
-        </p:style>
-        <p:txBody>
-          <a:bodyPr rtlCol="0" anchor="ctr"/>
-          <a:lstStyle/>
-          <a:p>
-            <a:pPr algn="ctr"/>
-            <a:r>
-              <a:rPr lang="en-AU" sz="1800" dirty="0">
-                <a:solidFill>
-                  <a:schemeClr val="bg2"/>
-                </a:solidFill>
-              </a:rPr>
-              <a:t>Assumption checking</a:t>
-            </a:r>
-          </a:p>
-        </p:txBody>
-      </p:sp>
-      <p:sp>
-        <p:nvSpPr>
-          <p:cNvPr id="11" name="Rectangle 10">
-            <a:extLst>
-              <a:ext uri="{FF2B5EF4-FFF2-40B4-BE49-F238E27FC236}">
-                <a16:creationId xmlns:a16="http://schemas.microsoft.com/office/drawing/2014/main" id="{7D542D0D-EF30-4847-8178-8E04C773B099}"/>
-              </a:ext>
-            </a:extLst>
-          </p:cNvPr>
-          <p:cNvSpPr/>
-          <p:nvPr/>
-        </p:nvSpPr>
-        <p:spPr>
-          <a:xfrm>
-            <a:off x="6199682" y="5415949"/>
-            <a:ext cx="5323980" cy="432658"/>
-          </a:xfrm>
-          <a:prstGeom prst="rect">
-            <a:avLst/>
-          </a:prstGeom>
-          <a:solidFill>
-            <a:schemeClr val="bg1"/>
-          </a:solidFill>
-          <a:ln w="38100">
-            <a:solidFill>
-              <a:schemeClr val="accent6"/>
-            </a:solidFill>
-          </a:ln>
-        </p:spPr>
-        <p:style>
-          <a:lnRef idx="2">
-            <a:schemeClr val="accent1">
-              <a:shade val="50000"/>
-            </a:schemeClr>
-          </a:lnRef>
-          <a:fillRef idx="1">
-            <a:schemeClr val="accent1"/>
-          </a:fillRef>
-          <a:effectRef idx="0">
-            <a:schemeClr val="accent1"/>
-          </a:effectRef>
-          <a:fontRef idx="minor">
-            <a:schemeClr val="lt1"/>
-          </a:fontRef>
-        </p:style>
-        <p:txBody>
-          <a:bodyPr rtlCol="0" anchor="ctr"/>
-          <a:lstStyle/>
-          <a:p>
-            <a:pPr algn="ctr"/>
-            <a:r>
-              <a:rPr lang="en-AU" sz="1800" dirty="0">
-                <a:solidFill>
-                  <a:schemeClr val="bg2"/>
-                </a:solidFill>
-              </a:rPr>
-              <a:t>Final model outputs and performance analysis</a:t>
-            </a:r>
-          </a:p>
-        </p:txBody>
-      </p:sp>
-      <p:cxnSp>
-        <p:nvCxnSpPr>
-          <p:cNvPr id="12" name="Straight Arrow Connector 11">
-            <a:extLst>
-              <a:ext uri="{FF2B5EF4-FFF2-40B4-BE49-F238E27FC236}">
-                <a16:creationId xmlns:a16="http://schemas.microsoft.com/office/drawing/2014/main" id="{D4DFDD97-F27F-014E-B453-8666ECBB72BE}"/>
-              </a:ext>
-            </a:extLst>
-          </p:cNvPr>
-          <p:cNvCxnSpPr>
-            <a:cxnSpLocks/>
-            <a:stCxn id="5" idx="2"/>
-            <a:endCxn id="7" idx="0"/>
-          </p:cNvCxnSpPr>
-          <p:nvPr/>
-        </p:nvCxnSpPr>
-        <p:spPr>
-          <a:xfrm>
-            <a:off x="8861672" y="2621941"/>
-            <a:ext cx="0" cy="370446"/>
-          </a:xfrm>
-          <a:prstGeom prst="straightConnector1">
-            <a:avLst/>
-          </a:prstGeom>
-          <a:ln w="25400">
-            <a:solidFill>
-              <a:schemeClr val="bg2"/>
-            </a:solidFill>
-            <a:tailEnd type="triangle"/>
-          </a:ln>
-        </p:spPr>
-        <p:style>
-          <a:lnRef idx="1">
-            <a:schemeClr val="accent1"/>
-          </a:lnRef>
-          <a:fillRef idx="0">
-            <a:schemeClr val="accent1"/>
-          </a:fillRef>
-          <a:effectRef idx="0">
-            <a:schemeClr val="accent1"/>
-          </a:effectRef>
-          <a:fontRef idx="minor">
-            <a:schemeClr val="tx1"/>
-          </a:fontRef>
-        </p:style>
-      </p:cxnSp>
-      <p:cxnSp>
-        <p:nvCxnSpPr>
-          <p:cNvPr id="14" name="Straight Arrow Connector 13">
-            <a:extLst>
-              <a:ext uri="{FF2B5EF4-FFF2-40B4-BE49-F238E27FC236}">
-                <a16:creationId xmlns:a16="http://schemas.microsoft.com/office/drawing/2014/main" id="{A484AA67-07B3-6642-9D7F-697800CA4C9F}"/>
-              </a:ext>
-            </a:extLst>
-          </p:cNvPr>
-          <p:cNvCxnSpPr>
-            <a:cxnSpLocks/>
-            <a:stCxn id="7" idx="2"/>
-            <a:endCxn id="8" idx="0"/>
-          </p:cNvCxnSpPr>
-          <p:nvPr/>
-        </p:nvCxnSpPr>
-        <p:spPr>
-          <a:xfrm>
-            <a:off x="8861672" y="3429795"/>
-            <a:ext cx="0" cy="370446"/>
-          </a:xfrm>
-          <a:prstGeom prst="straightConnector1">
-            <a:avLst/>
-          </a:prstGeom>
-          <a:ln w="25400">
-            <a:solidFill>
-              <a:schemeClr val="bg2"/>
-            </a:solidFill>
-            <a:tailEnd type="triangle"/>
-          </a:ln>
-        </p:spPr>
-        <p:style>
-          <a:lnRef idx="1">
-            <a:schemeClr val="accent1"/>
-          </a:lnRef>
-          <a:fillRef idx="0">
-            <a:schemeClr val="accent1"/>
-          </a:fillRef>
-          <a:effectRef idx="0">
-            <a:schemeClr val="accent1"/>
-          </a:effectRef>
-          <a:fontRef idx="minor">
-            <a:schemeClr val="tx1"/>
-          </a:fontRef>
-        </p:style>
-      </p:cxnSp>
-      <p:cxnSp>
-        <p:nvCxnSpPr>
-          <p:cNvPr id="16" name="Straight Arrow Connector 15">
-            <a:extLst>
-              <a:ext uri="{FF2B5EF4-FFF2-40B4-BE49-F238E27FC236}">
-                <a16:creationId xmlns:a16="http://schemas.microsoft.com/office/drawing/2014/main" id="{2CC0B4D5-F5DA-F542-A10A-D0EF0A982F41}"/>
-              </a:ext>
-            </a:extLst>
-          </p:cNvPr>
-          <p:cNvCxnSpPr>
-            <a:cxnSpLocks/>
-          </p:cNvCxnSpPr>
-          <p:nvPr/>
-        </p:nvCxnSpPr>
-        <p:spPr>
-          <a:xfrm>
-            <a:off x="6224850" y="4235273"/>
-            <a:ext cx="0" cy="372821"/>
-          </a:xfrm>
-          <a:prstGeom prst="straightConnector1">
-            <a:avLst/>
-          </a:prstGeom>
-          <a:ln w="25400">
-            <a:solidFill>
-              <a:schemeClr val="bg2"/>
-            </a:solidFill>
-            <a:tailEnd type="triangle"/>
-          </a:ln>
-        </p:spPr>
-        <p:style>
-          <a:lnRef idx="1">
-            <a:schemeClr val="accent1"/>
-          </a:lnRef>
-          <a:fillRef idx="0">
-            <a:schemeClr val="accent1"/>
-          </a:fillRef>
-          <a:effectRef idx="0">
-            <a:schemeClr val="accent1"/>
-          </a:effectRef>
-          <a:fontRef idx="minor">
-            <a:schemeClr val="tx1"/>
-          </a:fontRef>
-        </p:style>
-      </p:cxnSp>
-      <p:cxnSp>
-        <p:nvCxnSpPr>
-          <p:cNvPr id="18" name="Curved Connector 17">
-            <a:extLst>
-              <a:ext uri="{FF2B5EF4-FFF2-40B4-BE49-F238E27FC236}">
-                <a16:creationId xmlns:a16="http://schemas.microsoft.com/office/drawing/2014/main" id="{F2869C33-ABFD-8541-8E97-3DEAE371F6CD}"/>
-              </a:ext>
-            </a:extLst>
-          </p:cNvPr>
-          <p:cNvCxnSpPr>
-            <a:cxnSpLocks/>
-            <a:stCxn id="9" idx="2"/>
-            <a:endCxn id="10" idx="2"/>
-          </p:cNvCxnSpPr>
-          <p:nvPr/>
-        </p:nvCxnSpPr>
-        <p:spPr>
-          <a:xfrm rot="16200000" flipH="1">
-            <a:off x="8861672" y="3594652"/>
-            <a:ext cx="12700" cy="2896950"/>
-          </a:xfrm>
-          <a:prstGeom prst="curvedConnector3">
-            <a:avLst>
-              <a:gd name="adj1" fmla="val 1800000"/>
-            </a:avLst>
-          </a:prstGeom>
-          <a:ln w="25400">
-            <a:solidFill>
-              <a:schemeClr val="bg2"/>
-            </a:solidFill>
-            <a:tailEnd type="triangle"/>
-          </a:ln>
-        </p:spPr>
-        <p:style>
-          <a:lnRef idx="1">
-            <a:schemeClr val="accent1"/>
-          </a:lnRef>
-          <a:fillRef idx="0">
-            <a:schemeClr val="accent1"/>
-          </a:fillRef>
-          <a:effectRef idx="0">
-            <a:schemeClr val="accent1"/>
-          </a:effectRef>
-          <a:fontRef idx="minor">
-            <a:schemeClr val="tx1"/>
-          </a:fontRef>
-        </p:style>
-      </p:cxnSp>
-      <p:cxnSp>
-        <p:nvCxnSpPr>
-          <p:cNvPr id="20" name="Curved Connector 19">
-            <a:extLst>
-              <a:ext uri="{FF2B5EF4-FFF2-40B4-BE49-F238E27FC236}">
-                <a16:creationId xmlns:a16="http://schemas.microsoft.com/office/drawing/2014/main" id="{E8038A1A-FBEA-1042-BDBE-65E689760613}"/>
-              </a:ext>
-            </a:extLst>
-          </p:cNvPr>
-          <p:cNvCxnSpPr>
-            <a:cxnSpLocks/>
-            <a:stCxn id="10" idx="0"/>
-            <a:endCxn id="9" idx="0"/>
-          </p:cNvCxnSpPr>
-          <p:nvPr/>
-        </p:nvCxnSpPr>
-        <p:spPr>
-          <a:xfrm rot="16200000" flipV="1">
-            <a:off x="8860485" y="3160808"/>
-            <a:ext cx="2375" cy="2896950"/>
-          </a:xfrm>
-          <a:prstGeom prst="curvedConnector3">
-            <a:avLst>
-              <a:gd name="adj1" fmla="val 9725263"/>
-            </a:avLst>
-          </a:prstGeom>
-          <a:ln w="25400">
-            <a:solidFill>
-              <a:schemeClr val="bg2"/>
-            </a:solidFill>
-            <a:tailEnd type="triangle"/>
-          </a:ln>
-        </p:spPr>
-        <p:style>
-          <a:lnRef idx="1">
-            <a:schemeClr val="accent1"/>
-          </a:lnRef>
-          <a:fillRef idx="0">
-            <a:schemeClr val="accent1"/>
-          </a:fillRef>
-          <a:effectRef idx="0">
-            <a:schemeClr val="accent1"/>
-          </a:effectRef>
-          <a:fontRef idx="minor">
-            <a:schemeClr val="tx1"/>
-          </a:fontRef>
-        </p:style>
-      </p:cxnSp>
-      <p:cxnSp>
-        <p:nvCxnSpPr>
-          <p:cNvPr id="23" name="Straight Arrow Connector 22">
-            <a:extLst>
-              <a:ext uri="{FF2B5EF4-FFF2-40B4-BE49-F238E27FC236}">
-                <a16:creationId xmlns:a16="http://schemas.microsoft.com/office/drawing/2014/main" id="{D91A0A48-E99C-8241-A67F-4DD233452C2A}"/>
-              </a:ext>
-            </a:extLst>
-          </p:cNvPr>
-          <p:cNvCxnSpPr>
-            <a:cxnSpLocks/>
-          </p:cNvCxnSpPr>
-          <p:nvPr/>
-        </p:nvCxnSpPr>
-        <p:spPr>
-          <a:xfrm>
-            <a:off x="11523662" y="5049477"/>
-            <a:ext cx="0" cy="366471"/>
-          </a:xfrm>
-          <a:prstGeom prst="straightConnector1">
-            <a:avLst/>
-          </a:prstGeom>
-          <a:ln w="25400">
-            <a:solidFill>
-              <a:schemeClr val="bg2"/>
-            </a:solidFill>
-            <a:tailEnd type="triangle"/>
-          </a:ln>
-        </p:spPr>
-        <p:style>
-          <a:lnRef idx="1">
-            <a:schemeClr val="accent1"/>
-          </a:lnRef>
-          <a:fillRef idx="0">
-            <a:schemeClr val="accent1"/>
-          </a:fillRef>
-          <a:effectRef idx="0">
-            <a:schemeClr val="accent1"/>
-          </a:effectRef>
-          <a:fontRef idx="minor">
-            <a:schemeClr val="tx1"/>
-          </a:fontRef>
-        </p:style>
-      </p:cxnSp>
+          </a:blip>
+          <a:srcRect/>
+          <a:stretch/>
+        </p:blipFill>
+        <p:spPr>
+          <a:xfrm>
+            <a:off x="6161848" y="1774839"/>
+            <a:ext cx="5361814" cy="4214147"/>
+          </a:xfrm>
+          <a:prstGeom prst="rect">
+            <a:avLst/>
+          </a:prstGeom>
+        </p:spPr>
+      </p:pic>
     </p:spTree>
     <p:extLst>
       <p:ext uri="{BB962C8B-B14F-4D97-AF65-F5344CB8AC3E}">
@@ -27041,7 +27067,12 @@
             <p:ph sz="quarter" idx="23"/>
           </p:nvPr>
         </p:nvSpPr>
-        <p:spPr/>
+        <p:spPr>
+          <a:xfrm>
+            <a:off x="666750" y="1774062"/>
+            <a:ext cx="5339767" cy="3858642"/>
+          </a:xfrm>
+        </p:spPr>
         <p:txBody>
           <a:bodyPr/>
           <a:lstStyle/>
@@ -27050,107 +27081,41 @@
           </a:p>
         </p:txBody>
       </p:sp>
-      <p:sp>
-        <p:nvSpPr>
-          <p:cNvPr id="5" name="Rectangle 4">
+      <p:pic>
+        <p:nvPicPr>
+          <p:cNvPr id="6" name="Picture 5">
             <a:extLst>
               <a:ext uri="{FF2B5EF4-FFF2-40B4-BE49-F238E27FC236}">
-                <a16:creationId xmlns:a16="http://schemas.microsoft.com/office/drawing/2014/main" id="{5977D527-26C8-444C-89A2-C04A94872C6E}"/>
+                <a16:creationId xmlns:a16="http://schemas.microsoft.com/office/drawing/2014/main" id="{9E6DFE5E-AAEC-B049-BBF2-382D689D36B7}"/>
               </a:ext>
             </a:extLst>
           </p:cNvPr>
-          <p:cNvSpPr/>
+          <p:cNvPicPr>
+            <a:picLocks noChangeAspect="1"/>
+          </p:cNvPicPr>
           <p:nvPr/>
-        </p:nvSpPr>
-        <p:spPr>
-          <a:xfrm>
-            <a:off x="7130265" y="2167847"/>
-            <a:ext cx="4393398" cy="3359650"/>
-          </a:xfrm>
-          <a:prstGeom prst="rect">
-            <a:avLst/>
-          </a:prstGeom>
-          <a:solidFill>
-            <a:schemeClr val="accent3"/>
-          </a:solidFill>
-          <a:ln w="38100">
-            <a:solidFill>
-              <a:schemeClr val="accent3"/>
-            </a:solidFill>
-          </a:ln>
-        </p:spPr>
-        <p:style>
-          <a:lnRef idx="2">
-            <a:schemeClr val="accent1">
-              <a:shade val="50000"/>
-            </a:schemeClr>
-          </a:lnRef>
-          <a:fillRef idx="1">
-            <a:schemeClr val="accent1"/>
-          </a:fillRef>
-          <a:effectRef idx="0">
-            <a:schemeClr val="accent1"/>
-          </a:effectRef>
-          <a:fontRef idx="minor">
-            <a:schemeClr val="lt1"/>
-          </a:fontRef>
-        </p:style>
-        <p:txBody>
-          <a:bodyPr rtlCol="0" anchor="ctr"/>
-          <a:lstStyle/>
-          <a:p>
-            <a:pPr algn="ctr"/>
-            <a:r>
-              <a:rPr lang="en-AU" sz="3200" dirty="0" err="1">
-                <a:solidFill>
-                  <a:schemeClr val="bg2"/>
-                </a:solidFill>
-              </a:rPr>
-              <a:t>sjPlot</a:t>
-            </a:r>
-            <a:r>
-              <a:rPr lang="en-AU" sz="3200" dirty="0">
-                <a:solidFill>
-                  <a:schemeClr val="bg2"/>
-                </a:solidFill>
-              </a:rPr>
-              <a:t> model summary </a:t>
-            </a:r>
-            <a:r>
-              <a:rPr lang="en-AU" sz="3200" dirty="0" err="1">
-                <a:solidFill>
-                  <a:schemeClr val="bg2"/>
-                </a:solidFill>
-              </a:rPr>
-              <a:t>plot_model</a:t>
-            </a:r>
-            <a:r>
-              <a:rPr lang="en-AU" sz="3200" dirty="0">
-                <a:solidFill>
-                  <a:schemeClr val="bg2"/>
-                </a:solidFill>
-              </a:rPr>
-              <a:t>() or </a:t>
-            </a:r>
-            <a:r>
-              <a:rPr lang="en-AU" sz="3200" dirty="0" err="1">
-                <a:solidFill>
-                  <a:schemeClr val="bg2"/>
-                </a:solidFill>
-              </a:rPr>
-              <a:t>tab_model</a:t>
-            </a:r>
-            <a:r>
-              <a:rPr lang="en-AU" sz="3200" dirty="0">
-                <a:solidFill>
-                  <a:schemeClr val="bg2"/>
-                </a:solidFill>
-              </a:rPr>
-              <a:t>() here</a:t>
-            </a:r>
-          </a:p>
-        </p:txBody>
-      </p:sp>
+        </p:nvPicPr>
+        <p:blipFill>
+          <a:blip r:embed="rId2">
+            <a:extLst>
+              <a:ext uri="{28A0092B-C50C-407E-A947-70E740481C1C}">
+                <a14:useLocalDpi xmlns:a14="http://schemas.microsoft.com/office/drawing/2010/main" val="0"/>
+              </a:ext>
+            </a:extLst>
+          </a:blip>
+          <a:srcRect/>
+          <a:stretch/>
+        </p:blipFill>
+        <p:spPr>
+          <a:xfrm>
+            <a:off x="6161847" y="1774062"/>
+            <a:ext cx="5361816" cy="4341512"/>
+          </a:xfrm>
+          <a:prstGeom prst="rect">
+            <a:avLst/>
+          </a:prstGeom>
+        </p:spPr>
+      </p:pic>
     </p:spTree>
     <p:extLst>
       <p:ext uri="{BB962C8B-B14F-4D97-AF65-F5344CB8AC3E}">
@@ -28253,18 +28218,18 @@
 </file>
 
 <file path=customXml/item1.xml><?xml version="1.0" encoding="utf-8"?>
+<p:properties xmlns:p="http://schemas.microsoft.com/office/2006/metadata/properties" xmlns:xsi="http://www.w3.org/2001/XMLSchema-instance" xmlns:pc="http://schemas.microsoft.com/office/infopath/2007/PartnerControls">
+  <documentManagement/>
+</p:properties>
+</file>
+
+<file path=customXml/item2.xml><?xml version="1.0" encoding="utf-8"?>
 <?mso-contentType ?>
 <FormTemplates xmlns="http://schemas.microsoft.com/sharepoint/v3/contenttype/forms">
   <Display>DocumentLibraryForm</Display>
   <Edit>DocumentLibraryForm</Edit>
   <New>DocumentLibraryForm</New>
 </FormTemplates>
-</file>
-
-<file path=customXml/item2.xml><?xml version="1.0" encoding="utf-8"?>
-<p:properties xmlns:p="http://schemas.microsoft.com/office/2006/metadata/properties" xmlns:xsi="http://www.w3.org/2001/XMLSchema-instance" xmlns:pc="http://schemas.microsoft.com/office/infopath/2007/PartnerControls">
-  <documentManagement/>
-</p:properties>
 </file>
 
 <file path=customXml/item3.xml><?xml version="1.0" encoding="utf-8"?>
@@ -28471,14 +28436,6 @@
 </file>
 
 <file path=customXml/itemProps1.xml><?xml version="1.0" encoding="utf-8"?>
-<ds:datastoreItem xmlns:ds="http://schemas.openxmlformats.org/officeDocument/2006/customXml" ds:itemID="{0173B242-1203-4859-8453-A7C017C494AB}">
-  <ds:schemaRefs>
-    <ds:schemaRef ds:uri="http://schemas.microsoft.com/sharepoint/v3/contenttype/forms"/>
-  </ds:schemaRefs>
-</ds:datastoreItem>
-</file>
-
-<file path=customXml/itemProps2.xml><?xml version="1.0" encoding="utf-8"?>
 <ds:datastoreItem xmlns:ds="http://schemas.openxmlformats.org/officeDocument/2006/customXml" ds:itemID="{FF1C9025-37E4-4B60-BB55-82E97C9CA6D5}">
   <ds:schemaRefs>
     <ds:schemaRef ds:uri="http://www.w3.org/XML/1998/namespace"/>
@@ -28491,6 +28448,14 @@
     <ds:schemaRef ds:uri="http://schemas.microsoft.com/office/2006/documentManagement/types"/>
     <ds:schemaRef ds:uri="6cd22d0c-df22-4c4f-a401-cad966b5c9be"/>
     <ds:schemaRef ds:uri="fc6ab167-db70-4379-8869-a8cc7a1fa5d6"/>
+  </ds:schemaRefs>
+</ds:datastoreItem>
+</file>
+
+<file path=customXml/itemProps2.xml><?xml version="1.0" encoding="utf-8"?>
+<ds:datastoreItem xmlns:ds="http://schemas.openxmlformats.org/officeDocument/2006/customXml" ds:itemID="{0173B242-1203-4859-8453-A7C017C494AB}">
+  <ds:schemaRefs>
+    <ds:schemaRef ds:uri="http://schemas.microsoft.com/sharepoint/v3/contenttype/forms"/>
   </ds:schemaRefs>
 </ds:datastoreItem>
 </file>

</xml_diff>